<commit_message>
fixed typos in figures
</commit_message>
<xml_diff>
--- a/project/proposal/Masterplan-programmingProject.pptx
+++ b/project/proposal/Masterplan-programmingProject.pptx
@@ -6518,216 +6518,6 @@
           <a:chExt cx="0" cy="0"/>
         </a:xfrm>
       </p:grpSpPr>
-      <p:sp>
-        <p:nvSpPr>
-          <p:cNvPr id="4" name="Textfeld 3"/>
-          <p:cNvSpPr txBox="1"/>
-          <p:nvPr/>
-        </p:nvSpPr>
-        <p:spPr>
-          <a:xfrm>
-            <a:off x="2168013" y="6594086"/>
-            <a:ext cx="7000568" cy="369332"/>
-          </a:xfrm>
-          <a:prstGeom prst="rect">
-            <a:avLst/>
-          </a:prstGeom>
-          <a:noFill/>
-        </p:spPr>
-        <p:txBody>
-          <a:bodyPr wrap="square" rtlCol="0">
-            <a:spAutoFit/>
-          </a:bodyPr>
-          <a:lstStyle/>
-          <a:p>
-            <a:r>
-              <a:rPr lang="de-DE" dirty="0" err="1" smtClean="0"/>
-              <a:t>Structure</a:t>
-            </a:r>
-            <a:endParaRPr lang="de-DE" dirty="0"/>
-          </a:p>
-        </p:txBody>
-      </p:sp>
-      <p:sp>
-        <p:nvSpPr>
-          <p:cNvPr id="5" name="Abgerundetes Rechteck 4"/>
-          <p:cNvSpPr/>
-          <p:nvPr/>
-        </p:nvSpPr>
-        <p:spPr>
-          <a:xfrm>
-            <a:off x="983226" y="934065"/>
-            <a:ext cx="2507226" cy="4729316"/>
-          </a:xfrm>
-          <a:prstGeom prst="roundRect">
-            <a:avLst/>
-          </a:prstGeom>
-        </p:spPr>
-        <p:style>
-          <a:lnRef idx="2">
-            <a:schemeClr val="accent1">
-              <a:shade val="50000"/>
-            </a:schemeClr>
-          </a:lnRef>
-          <a:fillRef idx="1">
-            <a:schemeClr val="accent1"/>
-          </a:fillRef>
-          <a:effectRef idx="0">
-            <a:schemeClr val="accent1"/>
-          </a:effectRef>
-          <a:fontRef idx="minor">
-            <a:schemeClr val="lt1"/>
-          </a:fontRef>
-        </p:style>
-        <p:txBody>
-          <a:bodyPr rtlCol="0" anchor="ctr"/>
-          <a:lstStyle/>
-          <a:p>
-            <a:pPr algn="ctr"/>
-            <a:endParaRPr lang="de-DE"/>
-          </a:p>
-        </p:txBody>
-      </p:sp>
-      <p:sp>
-        <p:nvSpPr>
-          <p:cNvPr id="6" name="Textfeld 5"/>
-          <p:cNvSpPr txBox="1"/>
-          <p:nvPr/>
-        </p:nvSpPr>
-        <p:spPr>
-          <a:xfrm>
-            <a:off x="1209368" y="1150374"/>
-            <a:ext cx="1917290" cy="369332"/>
-          </a:xfrm>
-          <a:prstGeom prst="rect">
-            <a:avLst/>
-          </a:prstGeom>
-          <a:noFill/>
-        </p:spPr>
-        <p:txBody>
-          <a:bodyPr wrap="square" rtlCol="0">
-            <a:spAutoFit/>
-          </a:bodyPr>
-          <a:lstStyle/>
-          <a:p>
-            <a:r>
-              <a:rPr lang="de-DE" dirty="0" smtClean="0">
-                <a:solidFill>
-                  <a:schemeClr val="bg1"/>
-                </a:solidFill>
-              </a:rPr>
-              <a:t>Database</a:t>
-            </a:r>
-            <a:endParaRPr lang="de-DE" dirty="0">
-              <a:solidFill>
-                <a:schemeClr val="bg1"/>
-              </a:solidFill>
-            </a:endParaRPr>
-          </a:p>
-        </p:txBody>
-      </p:sp>
-      <p:cxnSp>
-        <p:nvCxnSpPr>
-          <p:cNvPr id="11" name="Gerade Verbindung mit Pfeil 10"/>
-          <p:cNvCxnSpPr/>
-          <p:nvPr/>
-        </p:nvCxnSpPr>
-        <p:spPr>
-          <a:xfrm>
-            <a:off x="8996516" y="2507226"/>
-            <a:ext cx="1563329" cy="9832"/>
-          </a:xfrm>
-          <a:prstGeom prst="straightConnector1">
-            <a:avLst/>
-          </a:prstGeom>
-          <a:ln>
-            <a:tailEnd type="triangle"/>
-          </a:ln>
-        </p:spPr>
-        <p:style>
-          <a:lnRef idx="1">
-            <a:schemeClr val="dk1"/>
-          </a:lnRef>
-          <a:fillRef idx="0">
-            <a:schemeClr val="dk1"/>
-          </a:fillRef>
-          <a:effectRef idx="0">
-            <a:schemeClr val="dk1"/>
-          </a:effectRef>
-          <a:fontRef idx="minor">
-            <a:schemeClr val="tx1"/>
-          </a:fontRef>
-        </p:style>
-      </p:cxnSp>
-      <p:sp>
-        <p:nvSpPr>
-          <p:cNvPr id="12" name="Textfeld 11"/>
-          <p:cNvSpPr txBox="1"/>
-          <p:nvPr/>
-        </p:nvSpPr>
-        <p:spPr>
-          <a:xfrm>
-            <a:off x="10677832" y="2359742"/>
-            <a:ext cx="1327355" cy="646331"/>
-          </a:xfrm>
-          <a:prstGeom prst="rect">
-            <a:avLst/>
-          </a:prstGeom>
-          <a:noFill/>
-        </p:spPr>
-        <p:txBody>
-          <a:bodyPr wrap="square" rtlCol="0">
-            <a:spAutoFit/>
-          </a:bodyPr>
-          <a:lstStyle/>
-          <a:p>
-            <a:r>
-              <a:rPr lang="de-DE" dirty="0" smtClean="0"/>
-              <a:t>Supervisor (?)</a:t>
-            </a:r>
-            <a:endParaRPr lang="de-DE" dirty="0"/>
-          </a:p>
-        </p:txBody>
-      </p:sp>
-      <p:cxnSp>
-        <p:nvCxnSpPr>
-          <p:cNvPr id="23" name="Gerader Verbinder 22"/>
-          <p:cNvCxnSpPr/>
-          <p:nvPr/>
-        </p:nvCxnSpPr>
-        <p:spPr>
-          <a:xfrm>
-            <a:off x="1120877" y="3608440"/>
-            <a:ext cx="2251588" cy="9831"/>
-          </a:xfrm>
-          <a:prstGeom prst="line">
-            <a:avLst/>
-          </a:prstGeom>
-          <a:ln w="9525" cap="flat" cmpd="sng" algn="ctr">
-            <a:solidFill>
-              <a:schemeClr val="dk1"/>
-            </a:solidFill>
-            <a:prstDash val="dash"/>
-            <a:round/>
-            <a:headEnd type="none" w="med" len="med"/>
-            <a:tailEnd type="none" w="med" len="med"/>
-          </a:ln>
-        </p:spPr>
-        <p:style>
-          <a:lnRef idx="0">
-            <a:scrgbClr r="0" g="0" b="0"/>
-          </a:lnRef>
-          <a:fillRef idx="0">
-            <a:scrgbClr r="0" g="0" b="0"/>
-          </a:fillRef>
-          <a:effectRef idx="0">
-            <a:scrgbClr r="0" g="0" b="0"/>
-          </a:effectRef>
-          <a:fontRef idx="minor">
-            <a:schemeClr val="tx1"/>
-          </a:fontRef>
-        </p:style>
-      </p:cxnSp>
       <p:grpSp>
         <p:nvGrpSpPr>
           <p:cNvPr id="2" name="Gruppieren 1"/>
@@ -6873,30 +6663,22 @@
             <a:lstStyle/>
             <a:p>
               <a:r>
-                <a:rPr lang="de-DE" dirty="0" err="1" smtClean="0">
+                <a:rPr lang="en-GB" dirty="0" smtClean="0">
                   <a:solidFill>
                     <a:schemeClr val="bg1"/>
                   </a:solidFill>
                 </a:rPr>
-                <a:t>GUi</a:t>
+                <a:t>GUI: JAVA </a:t>
               </a:r>
               <a:r>
-                <a:rPr lang="de-DE" dirty="0" smtClean="0">
-                  <a:solidFill>
-                    <a:schemeClr val="bg1"/>
-                  </a:solidFill>
-                </a:rPr>
-                <a:t>: JAVA </a:t>
-              </a:r>
-              <a:r>
-                <a:rPr lang="de-DE" dirty="0" err="1" smtClean="0">
+                <a:rPr lang="en-GB" dirty="0" err="1" smtClean="0">
                   <a:solidFill>
                     <a:schemeClr val="bg1"/>
                   </a:solidFill>
                 </a:rPr>
                 <a:t>Vaadin</a:t>
               </a:r>
-              <a:endParaRPr lang="de-DE" dirty="0" smtClean="0">
+              <a:endParaRPr lang="en-GB" dirty="0" smtClean="0">
                 <a:solidFill>
                   <a:schemeClr val="bg1"/>
                 </a:solidFill>
@@ -6908,26 +6690,13 @@
                 <a:buChar char="•"/>
               </a:pPr>
               <a:r>
-                <a:rPr lang="de-DE" dirty="0" smtClean="0">
+                <a:rPr lang="en-GB" dirty="0" smtClean="0">
                   <a:solidFill>
                     <a:schemeClr val="bg1"/>
                   </a:solidFill>
                 </a:rPr>
-                <a:t>New </a:t>
+                <a:t>New entry</a:t>
               </a:r>
-              <a:r>
-                <a:rPr lang="de-DE" dirty="0" err="1" smtClean="0">
-                  <a:solidFill>
-                    <a:schemeClr val="bg1"/>
-                  </a:solidFill>
-                </a:rPr>
-                <a:t>entry</a:t>
-              </a:r>
-              <a:endParaRPr lang="de-DE" dirty="0" smtClean="0">
-                <a:solidFill>
-                  <a:schemeClr val="bg1"/>
-                </a:solidFill>
-              </a:endParaRPr>
             </a:p>
             <a:p>
               <a:pPr marL="742950" lvl="1" indent="-285750">
@@ -6935,26 +6704,13 @@
                 <a:buChar char="•"/>
               </a:pPr>
               <a:r>
-                <a:rPr lang="de-DE" dirty="0" smtClean="0">
+                <a:rPr lang="en-GB" dirty="0" smtClean="0">
                   <a:solidFill>
                     <a:schemeClr val="bg1"/>
                   </a:solidFill>
                 </a:rPr>
-                <a:t>Search </a:t>
+                <a:t>Search entry</a:t>
               </a:r>
-              <a:r>
-                <a:rPr lang="de-DE" dirty="0" err="1" smtClean="0">
-                  <a:solidFill>
-                    <a:schemeClr val="bg1"/>
-                  </a:solidFill>
-                </a:rPr>
-                <a:t>entry</a:t>
-              </a:r>
-              <a:endParaRPr lang="de-DE" dirty="0">
-                <a:solidFill>
-                  <a:schemeClr val="bg1"/>
-                </a:solidFill>
-              </a:endParaRPr>
             </a:p>
             <a:p>
               <a:pPr marL="742950" lvl="1" indent="-285750">
@@ -6962,14 +6718,14 @@
                 <a:buChar char="•"/>
               </a:pPr>
               <a:r>
-                <a:rPr lang="de-DE" dirty="0" smtClean="0">
+                <a:rPr lang="en-GB" dirty="0" smtClean="0">
                   <a:solidFill>
                     <a:schemeClr val="bg1"/>
                   </a:solidFill>
                 </a:rPr>
                 <a:t>…</a:t>
               </a:r>
-              <a:endParaRPr lang="de-DE" dirty="0">
+              <a:endParaRPr lang="en-GB" dirty="0">
                 <a:solidFill>
                   <a:schemeClr val="bg1"/>
                 </a:solidFill>
@@ -7120,12 +6876,8 @@
             <a:lstStyle/>
             <a:p>
               <a:r>
-                <a:rPr lang="de-DE" dirty="0" err="1" smtClean="0"/>
-                <a:t>Applications</a:t>
-              </a:r>
-              <a:r>
-                <a:rPr lang="de-DE" dirty="0" smtClean="0"/>
-                <a:t>: JAVA</a:t>
+                <a:rPr lang="en-GB" dirty="0" smtClean="0"/>
+                <a:t>Applications: JAVA</a:t>
               </a:r>
             </a:p>
             <a:p>
@@ -7134,22 +6886,34 @@
                 <a:buChar char="•"/>
               </a:pPr>
               <a:r>
-                <a:rPr lang="de-DE" dirty="0" smtClean="0">
+                <a:rPr lang="en-GB" dirty="0" smtClean="0">
                   <a:solidFill>
                     <a:schemeClr val="bg1"/>
                   </a:solidFill>
                 </a:rPr>
-                <a:t>Search </a:t>
+                <a:t>Search algorithm</a:t>
               </a:r>
+            </a:p>
+            <a:p>
+              <a:pPr marL="742950" lvl="1" indent="-285750">
+                <a:buFont typeface="Arial" panose="020B0604020202020204" pitchFamily="34" charset="0"/>
+                <a:buChar char="•"/>
+              </a:pPr>
               <a:r>
-                <a:rPr lang="de-DE" dirty="0" err="1" smtClean="0">
+                <a:rPr lang="en-GB" dirty="0" smtClean="0">
                   <a:solidFill>
                     <a:schemeClr val="bg1"/>
                   </a:solidFill>
                 </a:rPr>
-                <a:t>algorithm</a:t>
+                <a:t>Alignments</a:t>
               </a:r>
-              <a:endParaRPr lang="de-DE" dirty="0" smtClean="0">
+            </a:p>
+            <a:p>
+              <a:pPr marL="742950" lvl="1" indent="-285750">
+                <a:buFont typeface="Arial" panose="020B0604020202020204" pitchFamily="34" charset="0"/>
+                <a:buChar char="•"/>
+              </a:pPr>
+              <a:endParaRPr lang="en-GB" dirty="0" smtClean="0">
                 <a:solidFill>
                   <a:schemeClr val="bg1"/>
                 </a:solidFill>
@@ -7161,18 +6925,219 @@
                 <a:buChar char="•"/>
               </a:pPr>
               <a:r>
-                <a:rPr lang="de-DE" dirty="0" err="1" smtClean="0">
+                <a:rPr lang="en-GB" dirty="0" smtClean="0">
                   <a:solidFill>
                     <a:schemeClr val="bg1"/>
                   </a:solidFill>
                 </a:rPr>
-                <a:t>Alignments</a:t>
+                <a:t>Cross references</a:t>
+              </a:r>
+            </a:p>
+            <a:p>
+              <a:pPr marL="742950" lvl="1" indent="-285750">
+                <a:buFont typeface="Arial" panose="020B0604020202020204" pitchFamily="34" charset="0"/>
+                <a:buChar char="•"/>
+              </a:pPr>
+              <a:endParaRPr lang="en-GB" dirty="0">
+                <a:solidFill>
+                  <a:schemeClr val="bg1"/>
+                </a:solidFill>
+              </a:endParaRPr>
+            </a:p>
+          </p:txBody>
+        </p:sp>
+      </p:grpSp>
+      <p:grpSp>
+        <p:nvGrpSpPr>
+          <p:cNvPr id="3" name="Gruppieren 2"/>
+          <p:cNvGrpSpPr/>
+          <p:nvPr/>
+        </p:nvGrpSpPr>
+        <p:grpSpPr>
+          <a:xfrm>
+            <a:off x="983226" y="934065"/>
+            <a:ext cx="2507226" cy="4729316"/>
+            <a:chOff x="983226" y="934065"/>
+            <a:chExt cx="2507226" cy="4729316"/>
+          </a:xfrm>
+        </p:grpSpPr>
+        <p:sp>
+          <p:nvSpPr>
+            <p:cNvPr id="5" name="Abgerundetes Rechteck 4"/>
+            <p:cNvSpPr/>
+            <p:nvPr/>
+          </p:nvSpPr>
+          <p:spPr>
+            <a:xfrm>
+              <a:off x="983226" y="934065"/>
+              <a:ext cx="2507226" cy="4729316"/>
+            </a:xfrm>
+            <a:prstGeom prst="roundRect">
+              <a:avLst/>
+            </a:prstGeom>
+          </p:spPr>
+          <p:style>
+            <a:lnRef idx="2">
+              <a:schemeClr val="accent1">
+                <a:shade val="50000"/>
+              </a:schemeClr>
+            </a:lnRef>
+            <a:fillRef idx="1">
+              <a:schemeClr val="accent1"/>
+            </a:fillRef>
+            <a:effectRef idx="0">
+              <a:schemeClr val="accent1"/>
+            </a:effectRef>
+            <a:fontRef idx="minor">
+              <a:schemeClr val="lt1"/>
+            </a:fontRef>
+          </p:style>
+          <p:txBody>
+            <a:bodyPr rtlCol="0" anchor="ctr"/>
+            <a:lstStyle/>
+            <a:p>
+              <a:pPr algn="ctr"/>
+              <a:endParaRPr lang="de-DE"/>
+            </a:p>
+          </p:txBody>
+        </p:sp>
+        <p:sp>
+          <p:nvSpPr>
+            <p:cNvPr id="6" name="Textfeld 5"/>
+            <p:cNvSpPr txBox="1"/>
+            <p:nvPr/>
+          </p:nvSpPr>
+          <p:spPr>
+            <a:xfrm>
+              <a:off x="1209368" y="1150374"/>
+              <a:ext cx="1917290" cy="369332"/>
+            </a:xfrm>
+            <a:prstGeom prst="rect">
+              <a:avLst/>
+            </a:prstGeom>
+            <a:noFill/>
+          </p:spPr>
+          <p:txBody>
+            <a:bodyPr wrap="square" rtlCol="0">
+              <a:spAutoFit/>
+            </a:bodyPr>
+            <a:lstStyle/>
+            <a:p>
+              <a:r>
+                <a:rPr lang="de-DE" dirty="0" smtClean="0">
+                  <a:solidFill>
+                    <a:schemeClr val="bg1"/>
+                  </a:solidFill>
+                </a:rPr>
+                <a:t>Database</a:t>
+              </a:r>
+              <a:endParaRPr lang="de-DE" dirty="0">
+                <a:solidFill>
+                  <a:schemeClr val="bg1"/>
+                </a:solidFill>
+              </a:endParaRPr>
+            </a:p>
+          </p:txBody>
+        </p:sp>
+        <p:cxnSp>
+          <p:nvCxnSpPr>
+            <p:cNvPr id="23" name="Gerader Verbinder 22"/>
+            <p:cNvCxnSpPr/>
+            <p:nvPr/>
+          </p:nvCxnSpPr>
+          <p:spPr>
+            <a:xfrm>
+              <a:off x="1120877" y="3608440"/>
+              <a:ext cx="2251588" cy="9831"/>
+            </a:xfrm>
+            <a:prstGeom prst="line">
+              <a:avLst/>
+            </a:prstGeom>
+            <a:ln w="9525" cap="flat" cmpd="sng" algn="ctr">
+              <a:solidFill>
+                <a:schemeClr val="dk1"/>
+              </a:solidFill>
+              <a:prstDash val="dash"/>
+              <a:round/>
+              <a:headEnd type="none" w="med" len="med"/>
+              <a:tailEnd type="none" w="med" len="med"/>
+            </a:ln>
+          </p:spPr>
+          <p:style>
+            <a:lnRef idx="0">
+              <a:scrgbClr r="0" g="0" b="0"/>
+            </a:lnRef>
+            <a:fillRef idx="0">
+              <a:scrgbClr r="0" g="0" b="0"/>
+            </a:fillRef>
+            <a:effectRef idx="0">
+              <a:scrgbClr r="0" g="0" b="0"/>
+            </a:effectRef>
+            <a:fontRef idx="minor">
+              <a:schemeClr val="tx1"/>
+            </a:fontRef>
+          </p:style>
+        </p:cxnSp>
+        <p:sp>
+          <p:nvSpPr>
+            <p:cNvPr id="30" name="Textfeld 29"/>
+            <p:cNvSpPr txBox="1"/>
+            <p:nvPr/>
+          </p:nvSpPr>
+          <p:spPr>
+            <a:xfrm>
+              <a:off x="1091381" y="1777491"/>
+              <a:ext cx="2153264" cy="1200329"/>
+            </a:xfrm>
+            <a:prstGeom prst="rect">
+              <a:avLst/>
+            </a:prstGeom>
+            <a:noFill/>
+          </p:spPr>
+          <p:txBody>
+            <a:bodyPr wrap="square" rtlCol="0">
+              <a:spAutoFit/>
+            </a:bodyPr>
+            <a:lstStyle/>
+            <a:p>
+              <a:r>
+                <a:rPr lang="de-DE" dirty="0" smtClean="0">
+                  <a:solidFill>
+                    <a:schemeClr val="bg1"/>
+                  </a:solidFill>
+                </a:rPr>
+                <a:t>S</a:t>
+              </a:r>
+              <a:r>
+                <a:rPr lang="de-DE" dirty="0" smtClean="0">
+                  <a:solidFill>
+                    <a:schemeClr val="bg1"/>
+                  </a:solidFill>
+                </a:rPr>
+                <a:t>cripts: Python</a:t>
               </a:r>
               <a:endParaRPr lang="de-DE" dirty="0" smtClean="0">
                 <a:solidFill>
                   <a:schemeClr val="bg1"/>
                 </a:solidFill>
               </a:endParaRPr>
+            </a:p>
+            <a:p>
+              <a:endParaRPr lang="de-DE" dirty="0">
+                <a:solidFill>
+                  <a:schemeClr val="bg1"/>
+                </a:solidFill>
+              </a:endParaRPr>
+            </a:p>
+            <a:p>
+              <a:r>
+                <a:rPr lang="de-DE" dirty="0" smtClean="0">
+                  <a:solidFill>
+                    <a:schemeClr val="bg1"/>
+                  </a:solidFill>
+                </a:rPr>
+                <a:t>CSVs</a:t>
+              </a:r>
             </a:p>
             <a:p>
               <a:pPr marL="742950" lvl="1" indent="-285750">
@@ -7185,215 +7150,42 @@
                 </a:solidFill>
               </a:endParaRPr>
             </a:p>
+          </p:txBody>
+        </p:sp>
+        <p:sp>
+          <p:nvSpPr>
+            <p:cNvPr id="31" name="Textfeld 30"/>
+            <p:cNvSpPr txBox="1"/>
+            <p:nvPr/>
+          </p:nvSpPr>
+          <p:spPr>
+            <a:xfrm>
+              <a:off x="1091381" y="3951268"/>
+              <a:ext cx="2153264" cy="369332"/>
+            </a:xfrm>
+            <a:prstGeom prst="rect">
+              <a:avLst/>
+            </a:prstGeom>
+            <a:noFill/>
+          </p:spPr>
+          <p:txBody>
+            <a:bodyPr wrap="square" rtlCol="0">
+              <a:spAutoFit/>
+            </a:bodyPr>
+            <a:lstStyle/>
             <a:p>
-              <a:pPr marL="742950" lvl="1" indent="-285750">
-                <a:buFont typeface="Arial" panose="020B0604020202020204" pitchFamily="34" charset="0"/>
-                <a:buChar char="•"/>
-              </a:pPr>
               <a:r>
                 <a:rPr lang="de-DE" dirty="0" smtClean="0">
                   <a:solidFill>
                     <a:schemeClr val="bg1"/>
                   </a:solidFill>
                 </a:rPr>
-                <a:t>Cross </a:t>
+                <a:t>Db.sqllite3</a:t>
               </a:r>
-              <a:r>
-                <a:rPr lang="de-DE" dirty="0" err="1" smtClean="0">
-                  <a:solidFill>
-                    <a:schemeClr val="bg1"/>
-                  </a:solidFill>
-                </a:rPr>
-                <a:t>references</a:t>
-              </a:r>
-              <a:endParaRPr lang="de-DE" dirty="0" smtClean="0">
-                <a:solidFill>
-                  <a:schemeClr val="bg1"/>
-                </a:solidFill>
-              </a:endParaRPr>
-            </a:p>
-            <a:p>
-              <a:pPr marL="742950" lvl="1" indent="-285750">
-                <a:buFont typeface="Arial" panose="020B0604020202020204" pitchFamily="34" charset="0"/>
-                <a:buChar char="•"/>
-              </a:pPr>
-              <a:endParaRPr lang="de-DE" dirty="0">
-                <a:solidFill>
-                  <a:schemeClr val="bg1"/>
-                </a:solidFill>
-              </a:endParaRPr>
             </a:p>
           </p:txBody>
         </p:sp>
       </p:grpSp>
-      <p:sp>
-        <p:nvSpPr>
-          <p:cNvPr id="30" name="Textfeld 29"/>
-          <p:cNvSpPr txBox="1"/>
-          <p:nvPr/>
-        </p:nvSpPr>
-        <p:spPr>
-          <a:xfrm>
-            <a:off x="1091381" y="1777491"/>
-            <a:ext cx="2153264" cy="1200329"/>
-          </a:xfrm>
-          <a:prstGeom prst="rect">
-            <a:avLst/>
-          </a:prstGeom>
-          <a:noFill/>
-        </p:spPr>
-        <p:txBody>
-          <a:bodyPr wrap="square" rtlCol="0">
-            <a:spAutoFit/>
-          </a:bodyPr>
-          <a:lstStyle/>
-          <a:p>
-            <a:r>
-              <a:rPr lang="de-DE" dirty="0" smtClean="0">
-                <a:solidFill>
-                  <a:schemeClr val="bg1"/>
-                </a:solidFill>
-              </a:rPr>
-              <a:t>Python - </a:t>
-            </a:r>
-            <a:r>
-              <a:rPr lang="de-DE" dirty="0" err="1" smtClean="0">
-                <a:solidFill>
-                  <a:schemeClr val="bg1"/>
-                </a:solidFill>
-              </a:rPr>
-              <a:t>scripts</a:t>
-            </a:r>
-            <a:endParaRPr lang="de-DE" dirty="0" smtClean="0">
-              <a:solidFill>
-                <a:schemeClr val="bg1"/>
-              </a:solidFill>
-            </a:endParaRPr>
-          </a:p>
-          <a:p>
-            <a:endParaRPr lang="de-DE" dirty="0">
-              <a:solidFill>
-                <a:schemeClr val="bg1"/>
-              </a:solidFill>
-            </a:endParaRPr>
-          </a:p>
-          <a:p>
-            <a:r>
-              <a:rPr lang="de-DE" dirty="0" smtClean="0">
-                <a:solidFill>
-                  <a:schemeClr val="bg1"/>
-                </a:solidFill>
-              </a:rPr>
-              <a:t>CSVs</a:t>
-            </a:r>
-          </a:p>
-          <a:p>
-            <a:pPr marL="742950" lvl="1" indent="-285750">
-              <a:buFont typeface="Arial" panose="020B0604020202020204" pitchFamily="34" charset="0"/>
-              <a:buChar char="•"/>
-            </a:pPr>
-            <a:endParaRPr lang="de-DE" dirty="0">
-              <a:solidFill>
-                <a:schemeClr val="bg1"/>
-              </a:solidFill>
-            </a:endParaRPr>
-          </a:p>
-        </p:txBody>
-      </p:sp>
-      <p:sp>
-        <p:nvSpPr>
-          <p:cNvPr id="31" name="Textfeld 30"/>
-          <p:cNvSpPr txBox="1"/>
-          <p:nvPr/>
-        </p:nvSpPr>
-        <p:spPr>
-          <a:xfrm>
-            <a:off x="1091381" y="3951268"/>
-            <a:ext cx="2153264" cy="369332"/>
-          </a:xfrm>
-          <a:prstGeom prst="rect">
-            <a:avLst/>
-          </a:prstGeom>
-          <a:noFill/>
-        </p:spPr>
-        <p:txBody>
-          <a:bodyPr wrap="square" rtlCol="0">
-            <a:spAutoFit/>
-          </a:bodyPr>
-          <a:lstStyle/>
-          <a:p>
-            <a:r>
-              <a:rPr lang="de-DE" dirty="0" smtClean="0">
-                <a:solidFill>
-                  <a:schemeClr val="bg1"/>
-                </a:solidFill>
-              </a:rPr>
-              <a:t>Db.sqllite3</a:t>
-            </a:r>
-          </a:p>
-        </p:txBody>
-      </p:sp>
-      <p:cxnSp>
-        <p:nvCxnSpPr>
-          <p:cNvPr id="38" name="Gerader Verbinder 37"/>
-          <p:cNvCxnSpPr/>
-          <p:nvPr/>
-        </p:nvCxnSpPr>
-        <p:spPr>
-          <a:xfrm flipV="1">
-            <a:off x="11189110" y="624971"/>
-            <a:ext cx="19664" cy="1606952"/>
-          </a:xfrm>
-          <a:prstGeom prst="line">
-            <a:avLst/>
-          </a:prstGeom>
-          <a:ln w="28575"/>
-        </p:spPr>
-        <p:style>
-          <a:lnRef idx="1">
-            <a:schemeClr val="dk1"/>
-          </a:lnRef>
-          <a:fillRef idx="0">
-            <a:schemeClr val="dk1"/>
-          </a:fillRef>
-          <a:effectRef idx="0">
-            <a:schemeClr val="dk1"/>
-          </a:effectRef>
-          <a:fontRef idx="minor">
-            <a:schemeClr val="tx1"/>
-          </a:fontRef>
-        </p:style>
-      </p:cxnSp>
-      <p:pic>
-        <p:nvPicPr>
-          <p:cNvPr id="24" name="Grafik 23"/>
-          <p:cNvPicPr>
-            <a:picLocks noChangeAspect="1"/>
-          </p:cNvPicPr>
-          <p:nvPr/>
-        </p:nvPicPr>
-        <p:blipFill>
-          <a:blip r:embed="rId3" cstate="print">
-            <a:extLst>
-              <a:ext uri="{28A0092B-C50C-407E-A947-70E740481C1C}">
-                <a14:useLocalDpi xmlns:a14="http://schemas.microsoft.com/office/drawing/2010/main" val="0"/>
-              </a:ext>
-            </a:extLst>
-          </a:blip>
-          <a:stretch>
-            <a:fillRect/>
-          </a:stretch>
-        </p:blipFill>
-        <p:spPr>
-          <a:xfrm>
-            <a:off x="10455025" y="5812969"/>
-            <a:ext cx="1364868" cy="831355"/>
-          </a:xfrm>
-          <a:prstGeom prst="rect">
-            <a:avLst/>
-          </a:prstGeom>
-        </p:spPr>
-      </p:pic>
     </p:spTree>
     <p:extLst>
       <p:ext uri="{BB962C8B-B14F-4D97-AF65-F5344CB8AC3E}">
@@ -7746,8 +7538,8 @@
         </p:nvSpPr>
         <p:spPr>
           <a:xfrm>
-            <a:off x="382556" y="5419272"/>
-            <a:ext cx="793102" cy="646331"/>
+            <a:off x="159833" y="4807304"/>
+            <a:ext cx="1038006" cy="646331"/>
           </a:xfrm>
           <a:prstGeom prst="rect">
             <a:avLst/>
@@ -8519,14 +8311,10 @@
           <a:lstStyle/>
           <a:p>
             <a:r>
-              <a:rPr lang="de-DE" dirty="0" smtClean="0"/>
-              <a:t>Cross </a:t>
-            </a:r>
-            <a:r>
-              <a:rPr lang="de-DE" dirty="0" err="1" smtClean="0"/>
-              <a:t>Referencing</a:t>
-            </a:r>
-            <a:endParaRPr lang="de-DE" dirty="0"/>
+              <a:rPr lang="en-GB" dirty="0" smtClean="0"/>
+              <a:t>Cross Referencing</a:t>
+            </a:r>
+            <a:endParaRPr lang="en-GB" dirty="0"/>
           </a:p>
         </p:txBody>
       </p:sp>
@@ -8572,8 +8360,12 @@
               <a:t>Import – Export </a:t>
             </a:r>
             <a:r>
-              <a:rPr lang="de-DE" dirty="0" err="1" smtClean="0"/>
-              <a:t>module</a:t>
+              <a:rPr lang="de-DE" dirty="0"/>
+              <a:t>M</a:t>
+            </a:r>
+            <a:r>
+              <a:rPr lang="de-DE" dirty="0" smtClean="0"/>
+              <a:t>odule</a:t>
             </a:r>
             <a:endParaRPr lang="de-DE" dirty="0"/>
           </a:p>
@@ -8639,102 +8431,14 @@
           <a:lstStyle/>
           <a:p>
             <a:r>
-              <a:rPr lang="de-DE" b="1" dirty="0" smtClean="0">
+              <a:rPr lang="en-GB" b="1" dirty="0" smtClean="0">
                 <a:solidFill>
                   <a:schemeClr val="accent2"/>
                 </a:solidFill>
               </a:rPr>
-              <a:t>Milestone 1 : </a:t>
-            </a:r>
-            <a:r>
-              <a:rPr lang="de-DE" b="1" dirty="0" err="1" smtClean="0">
-                <a:solidFill>
-                  <a:schemeClr val="accent2"/>
-                </a:solidFill>
-              </a:rPr>
-              <a:t>raw</a:t>
-            </a:r>
-            <a:r>
-              <a:rPr lang="de-DE" b="1" dirty="0" smtClean="0">
-                <a:solidFill>
-                  <a:schemeClr val="accent2"/>
-                </a:solidFill>
-              </a:rPr>
-              <a:t> </a:t>
-            </a:r>
-            <a:r>
-              <a:rPr lang="de-DE" b="1" dirty="0" err="1" smtClean="0">
-                <a:solidFill>
-                  <a:schemeClr val="accent2"/>
-                </a:solidFill>
-              </a:rPr>
-              <a:t>product</a:t>
-            </a:r>
-            <a:r>
-              <a:rPr lang="de-DE" b="1" dirty="0" smtClean="0">
-                <a:solidFill>
-                  <a:schemeClr val="accent2"/>
-                </a:solidFill>
-              </a:rPr>
-              <a:t>, wich </a:t>
-            </a:r>
-            <a:r>
-              <a:rPr lang="de-DE" b="1" dirty="0" err="1" smtClean="0">
-                <a:solidFill>
-                  <a:schemeClr val="accent2"/>
-                </a:solidFill>
-              </a:rPr>
-              <a:t>runs</a:t>
-            </a:r>
-            <a:r>
-              <a:rPr lang="de-DE" b="1" dirty="0" smtClean="0">
-                <a:solidFill>
-                  <a:schemeClr val="accent2"/>
-                </a:solidFill>
-              </a:rPr>
-              <a:t>, but </a:t>
-            </a:r>
-            <a:r>
-              <a:rPr lang="de-DE" b="1" dirty="0" err="1" smtClean="0">
-                <a:solidFill>
-                  <a:schemeClr val="accent2"/>
-                </a:solidFill>
-              </a:rPr>
-              <a:t>has</a:t>
-            </a:r>
-            <a:r>
-              <a:rPr lang="de-DE" b="1" dirty="0" smtClean="0">
-                <a:solidFill>
-                  <a:schemeClr val="accent2"/>
-                </a:solidFill>
-              </a:rPr>
-              <a:t> not </a:t>
-            </a:r>
-            <a:r>
-              <a:rPr lang="de-DE" b="1" dirty="0" err="1" smtClean="0">
-                <a:solidFill>
-                  <a:schemeClr val="accent2"/>
-                </a:solidFill>
-              </a:rPr>
-              <a:t>many</a:t>
-            </a:r>
-            <a:r>
-              <a:rPr lang="de-DE" b="1" dirty="0" smtClean="0">
-                <a:solidFill>
-                  <a:schemeClr val="accent2"/>
-                </a:solidFill>
-              </a:rPr>
-              <a:t> </a:t>
-            </a:r>
-            <a:r>
-              <a:rPr lang="de-DE" b="1" dirty="0" err="1" smtClean="0">
-                <a:solidFill>
-                  <a:schemeClr val="accent2"/>
-                </a:solidFill>
-              </a:rPr>
-              <a:t>functions</a:t>
-            </a:r>
-            <a:endParaRPr lang="de-DE" b="1" dirty="0">
+              <a:t>Milestone 1 : raw product, which runs, but has not many functions</a:t>
+            </a:r>
+            <a:endParaRPr lang="en-GB" b="1" dirty="0">
               <a:solidFill>
                 <a:schemeClr val="accent2"/>
               </a:solidFill>
@@ -8764,142 +8468,14 @@
           <a:lstStyle/>
           <a:p>
             <a:r>
-              <a:rPr lang="de-DE" b="1" dirty="0" smtClean="0">
+              <a:rPr lang="en-GB" b="1" dirty="0" smtClean="0">
                 <a:solidFill>
                   <a:schemeClr val="accent2"/>
                 </a:solidFill>
               </a:rPr>
-              <a:t>Milestone 2 : </a:t>
-            </a:r>
-            <a:r>
-              <a:rPr lang="de-DE" b="1" dirty="0" err="1" smtClean="0">
-                <a:solidFill>
-                  <a:schemeClr val="accent2"/>
-                </a:solidFill>
-              </a:rPr>
-              <a:t>What</a:t>
-            </a:r>
-            <a:r>
-              <a:rPr lang="de-DE" b="1" dirty="0" smtClean="0">
-                <a:solidFill>
-                  <a:schemeClr val="accent2"/>
-                </a:solidFill>
-              </a:rPr>
-              <a:t> </a:t>
-            </a:r>
-            <a:r>
-              <a:rPr lang="de-DE" b="1" dirty="0" err="1" smtClean="0">
-                <a:solidFill>
-                  <a:schemeClr val="accent2"/>
-                </a:solidFill>
-              </a:rPr>
-              <a:t>is</a:t>
-            </a:r>
-            <a:r>
-              <a:rPr lang="de-DE" b="1" dirty="0" smtClean="0">
-                <a:solidFill>
-                  <a:schemeClr val="accent2"/>
-                </a:solidFill>
-              </a:rPr>
-              <a:t> </a:t>
-            </a:r>
-            <a:r>
-              <a:rPr lang="de-DE" b="1" dirty="0" err="1" smtClean="0">
-                <a:solidFill>
-                  <a:schemeClr val="accent2"/>
-                </a:solidFill>
-              </a:rPr>
-              <a:t>missing</a:t>
-            </a:r>
-            <a:r>
-              <a:rPr lang="de-DE" b="1" dirty="0" smtClean="0">
-                <a:solidFill>
-                  <a:schemeClr val="accent2"/>
-                </a:solidFill>
-              </a:rPr>
-              <a:t>, </a:t>
-            </a:r>
-            <a:r>
-              <a:rPr lang="de-DE" b="1" dirty="0" err="1" smtClean="0">
-                <a:solidFill>
-                  <a:schemeClr val="accent2"/>
-                </a:solidFill>
-              </a:rPr>
-              <a:t>what</a:t>
-            </a:r>
-            <a:r>
-              <a:rPr lang="de-DE" b="1" dirty="0" smtClean="0">
-                <a:solidFill>
-                  <a:schemeClr val="accent2"/>
-                </a:solidFill>
-              </a:rPr>
-              <a:t> </a:t>
-            </a:r>
-            <a:r>
-              <a:rPr lang="de-DE" b="1" dirty="0" err="1" smtClean="0">
-                <a:solidFill>
-                  <a:schemeClr val="accent2"/>
-                </a:solidFill>
-              </a:rPr>
-              <a:t>needs</a:t>
-            </a:r>
-            <a:r>
-              <a:rPr lang="de-DE" b="1" dirty="0" smtClean="0">
-                <a:solidFill>
-                  <a:schemeClr val="accent2"/>
-                </a:solidFill>
-              </a:rPr>
-              <a:t> </a:t>
-            </a:r>
-            <a:r>
-              <a:rPr lang="de-DE" b="1" dirty="0" err="1" smtClean="0">
-                <a:solidFill>
-                  <a:schemeClr val="accent2"/>
-                </a:solidFill>
-              </a:rPr>
-              <a:t>to</a:t>
-            </a:r>
-            <a:r>
-              <a:rPr lang="de-DE" b="1" dirty="0" smtClean="0">
-                <a:solidFill>
-                  <a:schemeClr val="accent2"/>
-                </a:solidFill>
-              </a:rPr>
-              <a:t> </a:t>
-            </a:r>
-            <a:r>
-              <a:rPr lang="de-DE" b="1" dirty="0" err="1" smtClean="0">
-                <a:solidFill>
-                  <a:schemeClr val="accent2"/>
-                </a:solidFill>
-              </a:rPr>
-              <a:t>be</a:t>
-            </a:r>
-            <a:r>
-              <a:rPr lang="de-DE" b="1" dirty="0" smtClean="0">
-                <a:solidFill>
-                  <a:schemeClr val="accent2"/>
-                </a:solidFill>
-              </a:rPr>
-              <a:t> </a:t>
-            </a:r>
-            <a:r>
-              <a:rPr lang="de-DE" b="1" dirty="0" err="1" smtClean="0">
-                <a:solidFill>
-                  <a:schemeClr val="accent2"/>
-                </a:solidFill>
-              </a:rPr>
-              <a:t>optimized</a:t>
-            </a:r>
-            <a:r>
-              <a:rPr lang="de-DE" b="1" dirty="0" smtClean="0">
-                <a:solidFill>
-                  <a:schemeClr val="accent2"/>
-                </a:solidFill>
-              </a:rPr>
-              <a:t>?</a:t>
-            </a:r>
-            <a:endParaRPr lang="de-DE" b="1" dirty="0">
+              <a:t>Milestone 2 : What is missing, what needs to be optimized?</a:t>
+            </a:r>
+            <a:endParaRPr lang="en-GB" b="1" dirty="0">
               <a:solidFill>
                 <a:schemeClr val="accent2"/>
               </a:solidFill>
@@ -8953,8 +8529,8 @@
         </p:nvSpPr>
         <p:spPr>
           <a:xfrm>
-            <a:off x="396548" y="3918339"/>
-            <a:ext cx="793102" cy="1477328"/>
+            <a:off x="137652" y="3918339"/>
+            <a:ext cx="1051998" cy="923330"/>
           </a:xfrm>
           <a:prstGeom prst="rect">
             <a:avLst/>

</xml_diff>